<commit_message>
presantation updated by Stas
</commit_message>
<xml_diff>
--- a/assets/documents/Las Vegas Trip Organizer Presentation.pptx
+++ b/assets/documents/Las Vegas Trip Organizer Presentation.pptx
@@ -1141,7 +1141,7 @@
         </p:nvSpPr>
         <p:spPr>
           <a:xfrm>
-            <a:off x="381300" y="685800"/>
+            <a:off x="381000" y="685800"/>
             <a:ext cx="6096000" cy="3429000"/>
           </a:xfrm>
           <a:custGeom>
@@ -6215,73 +6215,11 @@
           </a:bodyPr>
           <a:lstStyle/>
           <a:p>
-            <a:pPr marL="0" lvl="0" indent="0" algn="ctr" rtl="0">
-              <a:spcBef>
-                <a:spcPts val="0"/>
-              </a:spcBef>
-              <a:spcAft>
-                <a:spcPts val="0"/>
-              </a:spcAft>
-              <a:buNone/>
-            </a:pPr>
             <a:r>
-              <a:rPr lang="en-CA" dirty="0">
-                <a:solidFill>
-                  <a:srgbClr val="FFFFFF"/>
-                </a:solidFill>
-                <a:highlight>
-                  <a:srgbClr val="FF0000"/>
-                </a:highlight>
-              </a:rPr>
-              <a:t>Las Vegas Trip Organizer</a:t>
+              <a:rPr lang="en-CA" b="1" dirty="0"/>
+              <a:t>Las Vegas Explorer App</a:t>
             </a:r>
-            <a:endParaRPr lang="en-CA" dirty="0">
-              <a:highlight>
-                <a:srgbClr val="FFFF00"/>
-              </a:highlight>
-            </a:endParaRPr>
-          </a:p>
-        </p:txBody>
-      </p:sp>
-      <p:sp>
-        <p:nvSpPr>
-          <p:cNvPr id="55" name="Google Shape;55;p13"/>
-          <p:cNvSpPr txBox="1">
-            <a:spLocks noGrp="1"/>
-          </p:cNvSpPr>
-          <p:nvPr>
-            <p:ph type="subTitle" idx="1"/>
-          </p:nvPr>
-        </p:nvSpPr>
-        <p:spPr>
-          <a:xfrm>
-            <a:off x="311700" y="2834125"/>
-            <a:ext cx="8520600" cy="792600"/>
-          </a:xfrm>
-          <a:prstGeom prst="rect">
-            <a:avLst/>
-          </a:prstGeom>
-        </p:spPr>
-        <p:txBody>
-          <a:bodyPr spcFirstLastPara="1" wrap="square" lIns="91425" tIns="91425" rIns="91425" bIns="91425" anchor="t" anchorCtr="0">
-            <a:noAutofit/>
-          </a:bodyPr>
-          <a:lstStyle/>
-          <a:p>
-            <a:pPr marL="0" lvl="0" indent="0" algn="ctr" rtl="0">
-              <a:spcBef>
-                <a:spcPts val="0"/>
-              </a:spcBef>
-              <a:spcAft>
-                <a:spcPts val="0"/>
-              </a:spcAft>
-              <a:buNone/>
-            </a:pPr>
-            <a:endParaRPr dirty="0">
-              <a:highlight>
-                <a:srgbClr val="FFFF00"/>
-              </a:highlight>
-            </a:endParaRPr>
+            <a:endParaRPr lang="en-CA" dirty="0"/>
           </a:p>
         </p:txBody>
       </p:sp>
@@ -6346,6 +6284,16 @@
               </a:rPr>
               <a:t>Elevator pitch</a:t>
             </a:r>
+            <a:r>
+              <a:rPr lang="en-CA" b="0" i="0" dirty="0">
+                <a:solidFill>
+                  <a:srgbClr val="1D1C1D"/>
+                </a:solidFill>
+                <a:effectLst/>
+                <a:latin typeface="Slack-Lato"/>
+              </a:rPr>
+              <a:t/>
+            </a:r>
             <a:br>
               <a:rPr lang="en-CA" b="0" i="0" dirty="0">
                 <a:solidFill>
@@ -6355,12 +6303,24 @@
                 <a:latin typeface="Slack-Lato"/>
               </a:rPr>
             </a:br>
+            <a:r>
+              <a:rPr lang="en" dirty="0"/>
+              <a:t/>
+            </a:r>
             <a:br>
               <a:rPr lang="en" dirty="0"/>
             </a:br>
             <a:r>
               <a:rPr lang="en" dirty="0"/>
-              <a:t>We have created a web page to help any user to find flight, hotels, restaurants, sports activities, concerts, etc. when user starts to plan a trip to Las Vegas. </a:t>
+              <a:t>We have created a web page to help </a:t>
+            </a:r>
+            <a:r>
+              <a:rPr lang="en" dirty="0" smtClean="0"/>
+              <a:t>the user </a:t>
+            </a:r>
+            <a:r>
+              <a:rPr lang="en" dirty="0"/>
+              <a:t>to find flight, hotels, restaurants, sports activities, concerts, etc. when user starts to plan a trip to Las Vegas. </a:t>
             </a:r>
             <a:endParaRPr dirty="0"/>
           </a:p>
@@ -7044,7 +7004,7 @@
         </p:nvSpPr>
         <p:spPr>
           <a:xfrm>
-            <a:off x="311700" y="2150850"/>
+            <a:off x="251244" y="-78472"/>
             <a:ext cx="8520600" cy="841800"/>
           </a:xfrm>
           <a:prstGeom prst="rect">
@@ -7074,6 +7034,36 @@
           </a:p>
         </p:txBody>
       </p:sp>
+      <p:pic>
+        <p:nvPicPr>
+          <p:cNvPr id="2" name="Picture 1"/>
+          <p:cNvPicPr>
+            <a:picLocks noChangeAspect="1"/>
+          </p:cNvPicPr>
+          <p:nvPr/>
+        </p:nvPicPr>
+        <p:blipFill>
+          <a:blip r:embed="rId3">
+            <a:extLst>
+              <a:ext uri="{28A0092B-C50C-407E-A947-70E740481C1C}">
+                <a14:useLocalDpi xmlns:a14="http://schemas.microsoft.com/office/drawing/2010/main" val="0"/>
+              </a:ext>
+            </a:extLst>
+          </a:blip>
+          <a:stretch>
+            <a:fillRect/>
+          </a:stretch>
+        </p:blipFill>
+        <p:spPr>
+          <a:xfrm>
+            <a:off x="0" y="707398"/>
+            <a:ext cx="9144000" cy="4436102"/>
+          </a:xfrm>
+          <a:prstGeom prst="rect">
+            <a:avLst/>
+          </a:prstGeom>
+        </p:spPr>
+      </p:pic>
     </p:spTree>
   </p:cSld>
   <p:clrMapOvr>

</xml_diff>